<commit_message>
Update login and sign_in
</commit_message>
<xml_diff>
--- a/design/design.pptx
+++ b/design/design.pptx
@@ -8,8 +8,9 @@
     <p:sldId id="256" r:id="rId2"/>
     <p:sldId id="257" r:id="rId3"/>
     <p:sldId id="258" r:id="rId4"/>
-    <p:sldId id="259" r:id="rId5"/>
-    <p:sldId id="260" r:id="rId6"/>
+    <p:sldId id="261" r:id="rId5"/>
+    <p:sldId id="259" r:id="rId6"/>
+    <p:sldId id="260" r:id="rId7"/>
   </p:sldIdLst>
   <p:sldSz cx="12192000" cy="6858000"/>
   <p:notesSz cx="6858000" cy="9144000"/>
@@ -108,6 +109,11 @@
       </a:defRPr>
     </a:lvl9pPr>
   </p:defaultTextStyle>
+  <p:extLst>
+    <p:ext uri="{EFAFB233-063F-42B5-8137-9DF3F51BA10A}">
+      <p15:sldGuideLst xmlns:p15="http://schemas.microsoft.com/office/powerpoint/2012/main"/>
+    </p:ext>
+  </p:extLst>
 </p:presentation>
 </file>
 
@@ -3102,48 +3108,8 @@
           <a:p>
             <a:pPr algn="ctr"/>
             <a:r>
-              <a:rPr lang="en-US" dirty="0" err="1" smtClean="0"/>
-              <a:t>Tên</a:t>
-            </a:r>
-            <a:r>
               <a:rPr lang="en-US" dirty="0" smtClean="0"/>
-              <a:t> </a:t>
-            </a:r>
-            <a:r>
-              <a:rPr lang="en-US" dirty="0" err="1" smtClean="0"/>
-              <a:t>đồ</a:t>
-            </a:r>
-            <a:r>
-              <a:rPr lang="en-US" dirty="0" smtClean="0"/>
-              <a:t> </a:t>
-            </a:r>
-            <a:r>
-              <a:rPr lang="en-US" dirty="0" err="1" smtClean="0"/>
-              <a:t>án</a:t>
-            </a:r>
-            <a:r>
-              <a:rPr lang="en-US" dirty="0" smtClean="0"/>
-              <a:t> </a:t>
-            </a:r>
-            <a:r>
-              <a:rPr lang="en-US" dirty="0" err="1" smtClean="0"/>
-              <a:t>em</a:t>
-            </a:r>
-            <a:r>
-              <a:rPr lang="en-US" dirty="0" smtClean="0"/>
-              <a:t> </a:t>
-            </a:r>
-            <a:r>
-              <a:rPr lang="en-US" dirty="0" err="1" smtClean="0"/>
-              <a:t>muốn</a:t>
-            </a:r>
-            <a:r>
-              <a:rPr lang="en-US" dirty="0" smtClean="0"/>
-              <a:t> </a:t>
-            </a:r>
-            <a:r>
-              <a:rPr lang="en-US" dirty="0" err="1" smtClean="0"/>
-              <a:t>để</a:t>
+              <a:t>Name</a:t>
             </a:r>
             <a:endParaRPr lang="en-US" dirty="0"/>
           </a:p>
@@ -3575,8 +3541,8 @@
           <a:p>
             <a:pPr algn="ctr"/>
             <a:r>
-              <a:rPr lang="en-US" dirty="0" err="1" smtClean="0"/>
-              <a:t>Regiser</a:t>
+              <a:rPr lang="en-US" dirty="0" smtClean="0"/>
+              <a:t>Register</a:t>
             </a:r>
             <a:endParaRPr lang="en-US" dirty="0"/>
           </a:p>
@@ -3722,14 +3688,14 @@
       </p:sp>
       <p:sp>
         <p:nvSpPr>
-          <p:cNvPr id="19" name="Rectangle 18"/>
+          <p:cNvPr id="22" name="Rectangle 21"/>
           <p:cNvSpPr/>
           <p:nvPr/>
         </p:nvSpPr>
         <p:spPr>
           <a:xfrm>
-            <a:off x="3596054" y="2857500"/>
-            <a:ext cx="3780692" cy="2708031"/>
+            <a:off x="5037992" y="2857500"/>
+            <a:ext cx="3930162" cy="2716822"/>
           </a:xfrm>
           <a:prstGeom prst="rect">
             <a:avLst/>
@@ -3756,22 +3722,26 @@
           <a:lstStyle/>
           <a:p>
             <a:pPr algn="ctr"/>
+            <a:r>
+              <a:rPr lang="en-US" dirty="0" smtClean="0"/>
+              <a:t>Time info</a:t>
+            </a:r>
             <a:endParaRPr lang="en-US" dirty="0"/>
           </a:p>
         </p:txBody>
       </p:sp>
       <p:sp>
         <p:nvSpPr>
-          <p:cNvPr id="20" name="Rectangle 19"/>
+          <p:cNvPr id="5" name="Rounded Rectangle 4"/>
           <p:cNvSpPr/>
           <p:nvPr/>
         </p:nvSpPr>
         <p:spPr>
           <a:xfrm>
-            <a:off x="7460639" y="3007763"/>
-            <a:ext cx="1414829" cy="1055077"/>
-          </a:xfrm>
-          <a:prstGeom prst="rect">
+            <a:off x="7121769" y="2189285"/>
+            <a:ext cx="940777" cy="395653"/>
+          </a:xfrm>
+          <a:prstGeom prst="roundRect">
             <a:avLst/>
           </a:prstGeom>
         </p:spPr>
@@ -3797,24 +3767,8 @@
           <a:p>
             <a:pPr algn="ctr"/>
             <a:r>
-              <a:rPr lang="en-US" dirty="0" err="1" smtClean="0"/>
-              <a:t>Ảnh</a:t>
-            </a:r>
-            <a:r>
               <a:rPr lang="en-US" dirty="0" smtClean="0"/>
-              <a:t> </a:t>
-            </a:r>
-            <a:r>
-              <a:rPr lang="en-US" dirty="0" err="1" smtClean="0"/>
-              <a:t>nhân</a:t>
-            </a:r>
-            <a:r>
-              <a:rPr lang="en-US" dirty="0" smtClean="0"/>
-              <a:t> </a:t>
-            </a:r>
-            <a:r>
-              <a:rPr lang="en-US" dirty="0" err="1" smtClean="0"/>
-              <a:t>viên</a:t>
+              <a:t>Info</a:t>
             </a:r>
             <a:endParaRPr lang="en-US" dirty="0"/>
           </a:p>
@@ -3822,16 +3776,16 @@
       </p:sp>
       <p:sp>
         <p:nvSpPr>
-          <p:cNvPr id="21" name="Rectangle 20"/>
+          <p:cNvPr id="6" name="Rounded Rectangle 5"/>
           <p:cNvSpPr/>
           <p:nvPr/>
         </p:nvSpPr>
         <p:spPr>
           <a:xfrm>
-            <a:off x="3587262" y="3235568"/>
-            <a:ext cx="1441938" cy="2321169"/>
-          </a:xfrm>
-          <a:prstGeom prst="rect">
+            <a:off x="3701562" y="3235569"/>
+            <a:ext cx="1239715" cy="422031"/>
+          </a:xfrm>
+          <a:prstGeom prst="roundRect">
             <a:avLst/>
           </a:prstGeom>
         </p:spPr>
@@ -3858,19 +3812,7 @@
             <a:pPr algn="ctr"/>
             <a:r>
               <a:rPr lang="en-US" dirty="0" smtClean="0"/>
-              <a:t>List </a:t>
-            </a:r>
-            <a:r>
-              <a:rPr lang="en-US" dirty="0" err="1" smtClean="0"/>
-              <a:t>nhân</a:t>
-            </a:r>
-            <a:r>
-              <a:rPr lang="en-US" dirty="0" smtClean="0"/>
-              <a:t> </a:t>
-            </a:r>
-            <a:r>
-              <a:rPr lang="en-US" dirty="0" err="1" smtClean="0"/>
-              <a:t>viên</a:t>
+              <a:t>ID</a:t>
             </a:r>
             <a:endParaRPr lang="en-US" dirty="0"/>
           </a:p>
@@ -3878,16 +3820,16 @@
       </p:sp>
       <p:sp>
         <p:nvSpPr>
-          <p:cNvPr id="22" name="Rectangle 21"/>
+          <p:cNvPr id="23" name="Rounded Rectangle 22"/>
           <p:cNvSpPr/>
           <p:nvPr/>
         </p:nvSpPr>
         <p:spPr>
           <a:xfrm>
-            <a:off x="5037992" y="3235568"/>
-            <a:ext cx="2347546" cy="2338754"/>
-          </a:xfrm>
-          <a:prstGeom prst="rect">
+            <a:off x="3719147" y="3815861"/>
+            <a:ext cx="1239715" cy="422031"/>
+          </a:xfrm>
+          <a:prstGeom prst="roundRect">
             <a:avLst/>
           </a:prstGeom>
         </p:spPr>
@@ -3913,24 +3855,8 @@
           <a:p>
             <a:pPr algn="ctr"/>
             <a:r>
-              <a:rPr lang="en-US" dirty="0" err="1" smtClean="0"/>
-              <a:t>Thời</a:t>
-            </a:r>
-            <a:r>
               <a:rPr lang="en-US" dirty="0" smtClean="0"/>
-              <a:t> </a:t>
-            </a:r>
-            <a:r>
-              <a:rPr lang="en-US" dirty="0" err="1" smtClean="0"/>
-              <a:t>gian</a:t>
-            </a:r>
-            <a:r>
-              <a:rPr lang="en-US" dirty="0" smtClean="0"/>
-              <a:t> chi </a:t>
-            </a:r>
-            <a:r>
-              <a:rPr lang="en-US" dirty="0" err="1" smtClean="0"/>
-              <a:t>tiết</a:t>
+              <a:t>Search</a:t>
             </a:r>
             <a:endParaRPr lang="en-US" dirty="0"/>
           </a:p>
@@ -4223,8 +4149,8 @@
           <a:p>
             <a:pPr algn="ctr"/>
             <a:r>
-              <a:rPr lang="en-US" dirty="0" err="1" smtClean="0"/>
-              <a:t>Regiser</a:t>
+              <a:rPr lang="en-US" dirty="0" smtClean="0"/>
+              <a:t>Register</a:t>
             </a:r>
             <a:endParaRPr lang="en-US" dirty="0"/>
           </a:p>
@@ -4330,7 +4256,7 @@
         </p:nvSpPr>
         <p:spPr>
           <a:xfrm>
-            <a:off x="3587262" y="2839916"/>
+            <a:off x="3587262" y="2866293"/>
             <a:ext cx="5380892" cy="2716822"/>
           </a:xfrm>
           <a:prstGeom prst="rect">
@@ -4465,8 +4391,8 @@
           <a:p>
             <a:pPr algn="ctr"/>
             <a:r>
-              <a:rPr lang="en-US" dirty="0" err="1" smtClean="0"/>
-              <a:t>Tên</a:t>
+              <a:rPr lang="en-US" dirty="0" smtClean="0"/>
+              <a:t>Name</a:t>
             </a:r>
             <a:endParaRPr lang="en-US" dirty="0"/>
           </a:p>
@@ -4511,6 +4437,182 @@
             <a:r>
               <a:rPr lang="en-US" dirty="0" smtClean="0"/>
               <a:t>ID</a:t>
+            </a:r>
+            <a:endParaRPr lang="en-US" dirty="0"/>
+          </a:p>
+        </p:txBody>
+      </p:sp>
+      <p:sp>
+        <p:nvSpPr>
+          <p:cNvPr id="5" name="Rounded Rectangle 4"/>
+          <p:cNvSpPr/>
+          <p:nvPr/>
+        </p:nvSpPr>
+        <p:spPr>
+          <a:xfrm>
+            <a:off x="3789485" y="3622431"/>
+            <a:ext cx="1424354" cy="378863"/>
+          </a:xfrm>
+          <a:prstGeom prst="roundRect">
+            <a:avLst/>
+          </a:prstGeom>
+        </p:spPr>
+        <p:style>
+          <a:lnRef idx="2">
+            <a:schemeClr val="accent1">
+              <a:shade val="50000"/>
+            </a:schemeClr>
+          </a:lnRef>
+          <a:fillRef idx="1">
+            <a:schemeClr val="accent1"/>
+          </a:fillRef>
+          <a:effectRef idx="0">
+            <a:schemeClr val="accent1"/>
+          </a:effectRef>
+          <a:fontRef idx="minor">
+            <a:schemeClr val="lt1"/>
+          </a:fontRef>
+        </p:style>
+        <p:txBody>
+          <a:bodyPr rtlCol="0" anchor="ctr"/>
+          <a:lstStyle/>
+          <a:p>
+            <a:pPr algn="ctr"/>
+            <a:r>
+              <a:rPr lang="en-US" dirty="0" smtClean="0"/>
+              <a:t>Email</a:t>
+            </a:r>
+            <a:endParaRPr lang="en-US" dirty="0"/>
+          </a:p>
+        </p:txBody>
+      </p:sp>
+      <p:sp>
+        <p:nvSpPr>
+          <p:cNvPr id="17" name="Rounded Rectangle 16"/>
+          <p:cNvSpPr/>
+          <p:nvPr/>
+        </p:nvSpPr>
+        <p:spPr>
+          <a:xfrm>
+            <a:off x="5548128" y="3622431"/>
+            <a:ext cx="1582616" cy="378863"/>
+          </a:xfrm>
+          <a:prstGeom prst="roundRect">
+            <a:avLst/>
+          </a:prstGeom>
+        </p:spPr>
+        <p:style>
+          <a:lnRef idx="2">
+            <a:schemeClr val="accent1">
+              <a:shade val="50000"/>
+            </a:schemeClr>
+          </a:lnRef>
+          <a:fillRef idx="1">
+            <a:schemeClr val="accent1"/>
+          </a:fillRef>
+          <a:effectRef idx="0">
+            <a:schemeClr val="accent1"/>
+          </a:effectRef>
+          <a:fontRef idx="minor">
+            <a:schemeClr val="lt1"/>
+          </a:fontRef>
+        </p:style>
+        <p:txBody>
+          <a:bodyPr rtlCol="0" anchor="ctr"/>
+          <a:lstStyle/>
+          <a:p>
+            <a:pPr algn="ctr"/>
+            <a:r>
+              <a:rPr lang="en-US" dirty="0" smtClean="0"/>
+              <a:t>Role</a:t>
+            </a:r>
+            <a:endParaRPr lang="en-US" dirty="0"/>
+          </a:p>
+        </p:txBody>
+      </p:sp>
+      <p:sp>
+        <p:nvSpPr>
+          <p:cNvPr id="22" name="Rounded Rectangle 21"/>
+          <p:cNvSpPr/>
+          <p:nvPr/>
+        </p:nvSpPr>
+        <p:spPr>
+          <a:xfrm>
+            <a:off x="5548128" y="4273062"/>
+            <a:ext cx="1582616" cy="378863"/>
+          </a:xfrm>
+          <a:prstGeom prst="roundRect">
+            <a:avLst/>
+          </a:prstGeom>
+        </p:spPr>
+        <p:style>
+          <a:lnRef idx="2">
+            <a:schemeClr val="accent1">
+              <a:shade val="50000"/>
+            </a:schemeClr>
+          </a:lnRef>
+          <a:fillRef idx="1">
+            <a:schemeClr val="accent1"/>
+          </a:fillRef>
+          <a:effectRef idx="0">
+            <a:schemeClr val="accent1"/>
+          </a:effectRef>
+          <a:fontRef idx="minor">
+            <a:schemeClr val="lt1"/>
+          </a:fontRef>
+        </p:style>
+        <p:txBody>
+          <a:bodyPr rtlCol="0" anchor="ctr"/>
+          <a:lstStyle/>
+          <a:p>
+            <a:pPr algn="ctr"/>
+            <a:r>
+              <a:rPr lang="en-US" dirty="0" smtClean="0"/>
+              <a:t>Submit</a:t>
+            </a:r>
+            <a:endParaRPr lang="en-US" dirty="0"/>
+          </a:p>
+        </p:txBody>
+      </p:sp>
+      <p:sp>
+        <p:nvSpPr>
+          <p:cNvPr id="26" name="Rounded Rectangle 25"/>
+          <p:cNvSpPr/>
+          <p:nvPr/>
+        </p:nvSpPr>
+        <p:spPr>
+          <a:xfrm>
+            <a:off x="3855518" y="4295041"/>
+            <a:ext cx="1424354" cy="378863"/>
+          </a:xfrm>
+          <a:prstGeom prst="roundRect">
+            <a:avLst/>
+          </a:prstGeom>
+        </p:spPr>
+        <p:style>
+          <a:lnRef idx="2">
+            <a:schemeClr val="accent1">
+              <a:shade val="50000"/>
+            </a:schemeClr>
+          </a:lnRef>
+          <a:fillRef idx="1">
+            <a:schemeClr val="accent1"/>
+          </a:fillRef>
+          <a:effectRef idx="0">
+            <a:schemeClr val="accent1"/>
+          </a:effectRef>
+          <a:fontRef idx="minor">
+            <a:schemeClr val="lt1"/>
+          </a:fontRef>
+        </p:style>
+        <p:txBody>
+          <a:bodyPr rtlCol="0" anchor="ctr"/>
+          <a:lstStyle/>
+          <a:p>
+            <a:pPr algn="ctr"/>
+            <a:r>
+              <a:rPr lang="en-US" dirty="0" smtClean="0"/>
+              <a:t>Contact</a:t>
             </a:r>
             <a:endParaRPr lang="en-US" dirty="0"/>
           </a:p>
@@ -4563,7 +4665,7 @@
           <a:p>
             <a:r>
               <a:rPr lang="en-US" dirty="0" smtClean="0"/>
-              <a:t>Login</a:t>
+              <a:t>Info</a:t>
             </a:r>
             <a:endParaRPr lang="en-US" dirty="0"/>
           </a:p>
@@ -4600,12 +4702,18 @@
         </p:nvSpPr>
         <p:spPr>
           <a:xfrm>
-            <a:off x="4123592" y="2365131"/>
-            <a:ext cx="3130062" cy="3437792"/>
+            <a:off x="3053861" y="1965020"/>
+            <a:ext cx="6191250" cy="3943350"/>
           </a:xfrm>
           <a:prstGeom prst="rect">
             <a:avLst/>
           </a:prstGeom>
+          <a:solidFill>
+            <a:schemeClr val="accent1">
+              <a:lumMod val="20000"/>
+              <a:lumOff val="80000"/>
+            </a:schemeClr>
+          </a:solidFill>
         </p:spPr>
         <p:style>
           <a:lnRef idx="2">
@@ -4640,18 +4748,12 @@
         </p:nvSpPr>
         <p:spPr>
           <a:xfrm>
-            <a:off x="4624754" y="3596054"/>
-            <a:ext cx="2145323" cy="430823"/>
+            <a:off x="3230440" y="2101362"/>
+            <a:ext cx="5838092" cy="650631"/>
           </a:xfrm>
           <a:prstGeom prst="rect">
             <a:avLst/>
           </a:prstGeom>
-          <a:solidFill>
-            <a:schemeClr val="accent3">
-              <a:lumMod val="60000"/>
-              <a:lumOff val="40000"/>
-            </a:schemeClr>
-          </a:solidFill>
         </p:spPr>
         <p:style>
           <a:lnRef idx="2">
@@ -4674,34 +4776,24 @@
           <a:lstStyle/>
           <a:p>
             <a:pPr algn="ctr"/>
-            <a:r>
-              <a:rPr lang="en-US" dirty="0" smtClean="0"/>
-              <a:t>Username</a:t>
-            </a:r>
-            <a:endParaRPr lang="en-US" dirty="0"/>
-          </a:p>
-        </p:txBody>
-      </p:sp>
-      <p:sp>
-        <p:nvSpPr>
-          <p:cNvPr id="6" name="Rectangle 5"/>
+            <a:endParaRPr lang="en-US"/>
+          </a:p>
+        </p:txBody>
+      </p:sp>
+      <p:sp>
+        <p:nvSpPr>
+          <p:cNvPr id="6" name="Rounded Rectangle 5"/>
           <p:cNvSpPr/>
           <p:nvPr/>
         </p:nvSpPr>
         <p:spPr>
           <a:xfrm>
-            <a:off x="4624754" y="4303834"/>
-            <a:ext cx="2145323" cy="430823"/>
-          </a:xfrm>
-          <a:prstGeom prst="rect">
+            <a:off x="3358661" y="2259623"/>
+            <a:ext cx="1072662" cy="395653"/>
+          </a:xfrm>
+          <a:prstGeom prst="roundRect">
             <a:avLst/>
           </a:prstGeom>
-          <a:solidFill>
-            <a:schemeClr val="accent3">
-              <a:lumMod val="40000"/>
-              <a:lumOff val="60000"/>
-            </a:schemeClr>
-          </a:solidFill>
         </p:spPr>
         <p:style>
           <a:lnRef idx="2">
@@ -4726,7 +4818,641 @@
             <a:pPr algn="ctr"/>
             <a:r>
               <a:rPr lang="en-US" dirty="0" smtClean="0"/>
-              <a:t>Password</a:t>
+              <a:t>Home</a:t>
+            </a:r>
+            <a:endParaRPr lang="en-US" dirty="0"/>
+          </a:p>
+        </p:txBody>
+      </p:sp>
+      <p:sp>
+        <p:nvSpPr>
+          <p:cNvPr id="7" name="Rounded Rectangle 6"/>
+          <p:cNvSpPr/>
+          <p:nvPr/>
+        </p:nvSpPr>
+        <p:spPr>
+          <a:xfrm>
+            <a:off x="4615961" y="2259623"/>
+            <a:ext cx="1055077" cy="395653"/>
+          </a:xfrm>
+          <a:prstGeom prst="roundRect">
+            <a:avLst/>
+          </a:prstGeom>
+        </p:spPr>
+        <p:style>
+          <a:lnRef idx="2">
+            <a:schemeClr val="accent1">
+              <a:shade val="50000"/>
+            </a:schemeClr>
+          </a:lnRef>
+          <a:fillRef idx="1">
+            <a:schemeClr val="accent1"/>
+          </a:fillRef>
+          <a:effectRef idx="0">
+            <a:schemeClr val="accent1"/>
+          </a:effectRef>
+          <a:fontRef idx="minor">
+            <a:schemeClr val="lt1"/>
+          </a:fontRef>
+        </p:style>
+        <p:txBody>
+          <a:bodyPr rtlCol="0" anchor="ctr"/>
+          <a:lstStyle/>
+          <a:p>
+            <a:pPr algn="ctr"/>
+            <a:r>
+              <a:rPr lang="en-US" dirty="0" smtClean="0"/>
+              <a:t>View</a:t>
+            </a:r>
+            <a:endParaRPr lang="en-US" dirty="0"/>
+          </a:p>
+        </p:txBody>
+      </p:sp>
+      <p:sp>
+        <p:nvSpPr>
+          <p:cNvPr id="8" name="Rounded Rectangle 7"/>
+          <p:cNvSpPr/>
+          <p:nvPr/>
+        </p:nvSpPr>
+        <p:spPr>
+          <a:xfrm>
+            <a:off x="5864469" y="2259623"/>
+            <a:ext cx="1099038" cy="395653"/>
+          </a:xfrm>
+          <a:prstGeom prst="roundRect">
+            <a:avLst/>
+          </a:prstGeom>
+        </p:spPr>
+        <p:style>
+          <a:lnRef idx="2">
+            <a:schemeClr val="accent1">
+              <a:shade val="50000"/>
+            </a:schemeClr>
+          </a:lnRef>
+          <a:fillRef idx="1">
+            <a:schemeClr val="accent1"/>
+          </a:fillRef>
+          <a:effectRef idx="0">
+            <a:schemeClr val="accent1"/>
+          </a:effectRef>
+          <a:fontRef idx="minor">
+            <a:schemeClr val="lt1"/>
+          </a:fontRef>
+        </p:style>
+        <p:txBody>
+          <a:bodyPr rtlCol="0" anchor="ctr"/>
+          <a:lstStyle/>
+          <a:p>
+            <a:pPr algn="ctr"/>
+            <a:r>
+              <a:rPr lang="en-US" dirty="0" smtClean="0"/>
+              <a:t>Register</a:t>
+            </a:r>
+            <a:endParaRPr lang="en-US" dirty="0"/>
+          </a:p>
+        </p:txBody>
+      </p:sp>
+      <p:sp>
+        <p:nvSpPr>
+          <p:cNvPr id="9" name="Oval 8"/>
+          <p:cNvSpPr/>
+          <p:nvPr/>
+        </p:nvSpPr>
+        <p:spPr>
+          <a:xfrm>
+            <a:off x="8475784" y="2259623"/>
+            <a:ext cx="422031" cy="395653"/>
+          </a:xfrm>
+          <a:prstGeom prst="ellipse">
+            <a:avLst/>
+          </a:prstGeom>
+          <a:solidFill>
+            <a:schemeClr val="accent1">
+              <a:lumMod val="20000"/>
+              <a:lumOff val="80000"/>
+            </a:schemeClr>
+          </a:solidFill>
+        </p:spPr>
+        <p:style>
+          <a:lnRef idx="2">
+            <a:schemeClr val="accent1">
+              <a:shade val="50000"/>
+            </a:schemeClr>
+          </a:lnRef>
+          <a:fillRef idx="1">
+            <a:schemeClr val="accent1"/>
+          </a:fillRef>
+          <a:effectRef idx="0">
+            <a:schemeClr val="accent1"/>
+          </a:effectRef>
+          <a:fontRef idx="minor">
+            <a:schemeClr val="lt1"/>
+          </a:fontRef>
+        </p:style>
+        <p:txBody>
+          <a:bodyPr rtlCol="0" anchor="ctr"/>
+          <a:lstStyle/>
+          <a:p>
+            <a:pPr algn="ctr"/>
+            <a:endParaRPr lang="en-US"/>
+          </a:p>
+        </p:txBody>
+      </p:sp>
+      <p:sp>
+        <p:nvSpPr>
+          <p:cNvPr id="10" name="Rectangle 9"/>
+          <p:cNvSpPr/>
+          <p:nvPr/>
+        </p:nvSpPr>
+        <p:spPr>
+          <a:xfrm>
+            <a:off x="3230440" y="2751993"/>
+            <a:ext cx="5838092" cy="2963007"/>
+          </a:xfrm>
+          <a:prstGeom prst="rect">
+            <a:avLst/>
+          </a:prstGeom>
+          <a:solidFill>
+            <a:schemeClr val="accent1">
+              <a:lumMod val="20000"/>
+              <a:lumOff val="80000"/>
+            </a:schemeClr>
+          </a:solidFill>
+        </p:spPr>
+        <p:style>
+          <a:lnRef idx="2">
+            <a:schemeClr val="accent1">
+              <a:shade val="50000"/>
+            </a:schemeClr>
+          </a:lnRef>
+          <a:fillRef idx="1">
+            <a:schemeClr val="accent1"/>
+          </a:fillRef>
+          <a:effectRef idx="0">
+            <a:schemeClr val="accent1"/>
+          </a:effectRef>
+          <a:fontRef idx="minor">
+            <a:schemeClr val="lt1"/>
+          </a:fontRef>
+        </p:style>
+        <p:txBody>
+          <a:bodyPr rtlCol="0" anchor="ctr"/>
+          <a:lstStyle/>
+          <a:p>
+            <a:pPr algn="ctr"/>
+            <a:endParaRPr lang="en-US"/>
+          </a:p>
+        </p:txBody>
+      </p:sp>
+      <p:sp>
+        <p:nvSpPr>
+          <p:cNvPr id="11" name="Rectangle 10"/>
+          <p:cNvSpPr/>
+          <p:nvPr/>
+        </p:nvSpPr>
+        <p:spPr>
+          <a:xfrm>
+            <a:off x="3516923" y="2936631"/>
+            <a:ext cx="5380892" cy="2716822"/>
+          </a:xfrm>
+          <a:prstGeom prst="rect">
+            <a:avLst/>
+          </a:prstGeom>
+          <a:solidFill>
+            <a:schemeClr val="accent2">
+              <a:lumMod val="20000"/>
+              <a:lumOff val="80000"/>
+            </a:schemeClr>
+          </a:solidFill>
+        </p:spPr>
+        <p:style>
+          <a:lnRef idx="2">
+            <a:schemeClr val="accent1">
+              <a:shade val="50000"/>
+            </a:schemeClr>
+          </a:lnRef>
+          <a:fillRef idx="1">
+            <a:schemeClr val="accent1"/>
+          </a:fillRef>
+          <a:effectRef idx="0">
+            <a:schemeClr val="accent1"/>
+          </a:effectRef>
+          <a:fontRef idx="minor">
+            <a:schemeClr val="lt1"/>
+          </a:fontRef>
+        </p:style>
+        <p:txBody>
+          <a:bodyPr rtlCol="0" anchor="ctr"/>
+          <a:lstStyle/>
+          <a:p>
+            <a:pPr algn="ctr"/>
+            <a:endParaRPr lang="en-US"/>
+          </a:p>
+        </p:txBody>
+      </p:sp>
+      <p:sp>
+        <p:nvSpPr>
+          <p:cNvPr id="12" name="Rectangle 11"/>
+          <p:cNvSpPr/>
+          <p:nvPr/>
+        </p:nvSpPr>
+        <p:spPr>
+          <a:xfrm>
+            <a:off x="7394696" y="3016555"/>
+            <a:ext cx="1414829" cy="1055077"/>
+          </a:xfrm>
+          <a:prstGeom prst="rect">
+            <a:avLst/>
+          </a:prstGeom>
+        </p:spPr>
+        <p:style>
+          <a:lnRef idx="2">
+            <a:schemeClr val="accent1">
+              <a:shade val="50000"/>
+            </a:schemeClr>
+          </a:lnRef>
+          <a:fillRef idx="1">
+            <a:schemeClr val="accent1"/>
+          </a:fillRef>
+          <a:effectRef idx="0">
+            <a:schemeClr val="accent1"/>
+          </a:effectRef>
+          <a:fontRef idx="minor">
+            <a:schemeClr val="lt1"/>
+          </a:fontRef>
+        </p:style>
+        <p:txBody>
+          <a:bodyPr rtlCol="0" anchor="ctr"/>
+          <a:lstStyle/>
+          <a:p>
+            <a:pPr algn="ctr"/>
+            <a:r>
+              <a:rPr lang="en-US" dirty="0" err="1" smtClean="0"/>
+              <a:t>Ảnh</a:t>
+            </a:r>
+            <a:r>
+              <a:rPr lang="en-US" dirty="0" smtClean="0"/>
+              <a:t> </a:t>
+            </a:r>
+            <a:r>
+              <a:rPr lang="en-US" dirty="0" err="1" smtClean="0"/>
+              <a:t>nhân</a:t>
+            </a:r>
+            <a:r>
+              <a:rPr lang="en-US" dirty="0" smtClean="0"/>
+              <a:t> </a:t>
+            </a:r>
+            <a:r>
+              <a:rPr lang="en-US" dirty="0" err="1" smtClean="0"/>
+              <a:t>viên</a:t>
+            </a:r>
+            <a:endParaRPr lang="en-US" dirty="0"/>
+          </a:p>
+        </p:txBody>
+      </p:sp>
+      <p:sp>
+        <p:nvSpPr>
+          <p:cNvPr id="20" name="Rounded Rectangle 19"/>
+          <p:cNvSpPr/>
+          <p:nvPr/>
+        </p:nvSpPr>
+        <p:spPr>
+          <a:xfrm>
+            <a:off x="7165731" y="2259623"/>
+            <a:ext cx="852854" cy="395653"/>
+          </a:xfrm>
+          <a:prstGeom prst="roundRect">
+            <a:avLst/>
+          </a:prstGeom>
+        </p:spPr>
+        <p:style>
+          <a:lnRef idx="2">
+            <a:schemeClr val="accent1">
+              <a:shade val="50000"/>
+            </a:schemeClr>
+          </a:lnRef>
+          <a:fillRef idx="1">
+            <a:schemeClr val="accent1"/>
+          </a:fillRef>
+          <a:effectRef idx="0">
+            <a:schemeClr val="accent1"/>
+          </a:effectRef>
+          <a:fontRef idx="minor">
+            <a:schemeClr val="lt1"/>
+          </a:fontRef>
+        </p:style>
+        <p:txBody>
+          <a:bodyPr rtlCol="0" anchor="ctr"/>
+          <a:lstStyle/>
+          <a:p>
+            <a:pPr algn="ctr"/>
+            <a:r>
+              <a:rPr lang="en-US" dirty="0" smtClean="0"/>
+              <a:t>Info</a:t>
+            </a:r>
+            <a:endParaRPr lang="en-US" dirty="0"/>
+          </a:p>
+        </p:txBody>
+      </p:sp>
+      <p:sp>
+        <p:nvSpPr>
+          <p:cNvPr id="21" name="Rectangle 20"/>
+          <p:cNvSpPr/>
+          <p:nvPr/>
+        </p:nvSpPr>
+        <p:spPr>
+          <a:xfrm>
+            <a:off x="3675185" y="3016555"/>
+            <a:ext cx="1389184" cy="2320376"/>
+          </a:xfrm>
+          <a:prstGeom prst="rect">
+            <a:avLst/>
+          </a:prstGeom>
+        </p:spPr>
+        <p:style>
+          <a:lnRef idx="2">
+            <a:schemeClr val="accent1">
+              <a:shade val="50000"/>
+            </a:schemeClr>
+          </a:lnRef>
+          <a:fillRef idx="1">
+            <a:schemeClr val="accent1"/>
+          </a:fillRef>
+          <a:effectRef idx="0">
+            <a:schemeClr val="accent1"/>
+          </a:effectRef>
+          <a:fontRef idx="minor">
+            <a:schemeClr val="lt1"/>
+          </a:fontRef>
+        </p:style>
+        <p:txBody>
+          <a:bodyPr rtlCol="0" anchor="ctr"/>
+          <a:lstStyle/>
+          <a:p>
+            <a:pPr algn="ctr"/>
+            <a:endParaRPr lang="en-US"/>
+          </a:p>
+        </p:txBody>
+      </p:sp>
+      <p:sp>
+        <p:nvSpPr>
+          <p:cNvPr id="23" name="Rectangle 22"/>
+          <p:cNvSpPr/>
+          <p:nvPr/>
+        </p:nvSpPr>
+        <p:spPr>
+          <a:xfrm>
+            <a:off x="5209624" y="3016555"/>
+            <a:ext cx="1879724" cy="483576"/>
+          </a:xfrm>
+          <a:prstGeom prst="rect">
+            <a:avLst/>
+          </a:prstGeom>
+        </p:spPr>
+        <p:style>
+          <a:lnRef idx="2">
+            <a:schemeClr val="accent1">
+              <a:shade val="50000"/>
+            </a:schemeClr>
+          </a:lnRef>
+          <a:fillRef idx="1">
+            <a:schemeClr val="accent1"/>
+          </a:fillRef>
+          <a:effectRef idx="0">
+            <a:schemeClr val="accent1"/>
+          </a:effectRef>
+          <a:fontRef idx="minor">
+            <a:schemeClr val="lt1"/>
+          </a:fontRef>
+        </p:style>
+        <p:txBody>
+          <a:bodyPr rtlCol="0" anchor="ctr"/>
+          <a:lstStyle/>
+          <a:p>
+            <a:pPr algn="ctr"/>
+            <a:r>
+              <a:rPr lang="en-US" dirty="0" smtClean="0"/>
+              <a:t>Name</a:t>
+            </a:r>
+            <a:endParaRPr lang="en-US" dirty="0"/>
+          </a:p>
+        </p:txBody>
+      </p:sp>
+      <p:sp>
+        <p:nvSpPr>
+          <p:cNvPr id="25" name="Rectangle 24"/>
+          <p:cNvSpPr/>
+          <p:nvPr/>
+        </p:nvSpPr>
+        <p:spPr>
+          <a:xfrm>
+            <a:off x="5209624" y="3588056"/>
+            <a:ext cx="1879724" cy="483576"/>
+          </a:xfrm>
+          <a:prstGeom prst="rect">
+            <a:avLst/>
+          </a:prstGeom>
+        </p:spPr>
+        <p:style>
+          <a:lnRef idx="2">
+            <a:schemeClr val="accent1">
+              <a:shade val="50000"/>
+            </a:schemeClr>
+          </a:lnRef>
+          <a:fillRef idx="1">
+            <a:schemeClr val="accent1"/>
+          </a:fillRef>
+          <a:effectRef idx="0">
+            <a:schemeClr val="accent1"/>
+          </a:effectRef>
+          <a:fontRef idx="minor">
+            <a:schemeClr val="lt1"/>
+          </a:fontRef>
+        </p:style>
+        <p:txBody>
+          <a:bodyPr rtlCol="0" anchor="ctr"/>
+          <a:lstStyle/>
+          <a:p>
+            <a:pPr algn="ctr"/>
+            <a:r>
+              <a:rPr lang="en-US" dirty="0" smtClean="0"/>
+              <a:t>Email</a:t>
+            </a:r>
+            <a:endParaRPr lang="en-US" dirty="0"/>
+          </a:p>
+        </p:txBody>
+      </p:sp>
+      <p:sp>
+        <p:nvSpPr>
+          <p:cNvPr id="26" name="Rectangle 25"/>
+          <p:cNvSpPr/>
+          <p:nvPr/>
+        </p:nvSpPr>
+        <p:spPr>
+          <a:xfrm>
+            <a:off x="5240948" y="4176743"/>
+            <a:ext cx="1879724" cy="483576"/>
+          </a:xfrm>
+          <a:prstGeom prst="rect">
+            <a:avLst/>
+          </a:prstGeom>
+        </p:spPr>
+        <p:style>
+          <a:lnRef idx="2">
+            <a:schemeClr val="accent1">
+              <a:shade val="50000"/>
+            </a:schemeClr>
+          </a:lnRef>
+          <a:fillRef idx="1">
+            <a:schemeClr val="accent1"/>
+          </a:fillRef>
+          <a:effectRef idx="0">
+            <a:schemeClr val="accent1"/>
+          </a:effectRef>
+          <a:fontRef idx="minor">
+            <a:schemeClr val="lt1"/>
+          </a:fontRef>
+        </p:style>
+        <p:txBody>
+          <a:bodyPr rtlCol="0" anchor="ctr"/>
+          <a:lstStyle/>
+          <a:p>
+            <a:pPr algn="ctr"/>
+            <a:r>
+              <a:rPr lang="en-US" dirty="0" smtClean="0"/>
+              <a:t>Role</a:t>
+            </a:r>
+            <a:endParaRPr lang="en-US" dirty="0"/>
+          </a:p>
+        </p:txBody>
+      </p:sp>
+      <p:sp>
+        <p:nvSpPr>
+          <p:cNvPr id="27" name="Rectangle 26"/>
+          <p:cNvSpPr/>
+          <p:nvPr/>
+        </p:nvSpPr>
+        <p:spPr>
+          <a:xfrm>
+            <a:off x="5240948" y="4825082"/>
+            <a:ext cx="1879724" cy="483576"/>
+          </a:xfrm>
+          <a:prstGeom prst="rect">
+            <a:avLst/>
+          </a:prstGeom>
+        </p:spPr>
+        <p:style>
+          <a:lnRef idx="2">
+            <a:schemeClr val="accent1">
+              <a:shade val="50000"/>
+            </a:schemeClr>
+          </a:lnRef>
+          <a:fillRef idx="1">
+            <a:schemeClr val="accent1"/>
+          </a:fillRef>
+          <a:effectRef idx="0">
+            <a:schemeClr val="accent1"/>
+          </a:effectRef>
+          <a:fontRef idx="minor">
+            <a:schemeClr val="lt1"/>
+          </a:fontRef>
+        </p:style>
+        <p:txBody>
+          <a:bodyPr rtlCol="0" anchor="ctr"/>
+          <a:lstStyle/>
+          <a:p>
+            <a:pPr algn="ctr"/>
+            <a:r>
+              <a:rPr lang="en-US" dirty="0" smtClean="0"/>
+              <a:t>Contact</a:t>
+            </a:r>
+            <a:endParaRPr lang="en-US" dirty="0"/>
+          </a:p>
+        </p:txBody>
+      </p:sp>
+      <p:sp>
+        <p:nvSpPr>
+          <p:cNvPr id="28" name="Rounded Rectangle 27"/>
+          <p:cNvSpPr/>
+          <p:nvPr/>
+        </p:nvSpPr>
+        <p:spPr>
+          <a:xfrm>
+            <a:off x="3756789" y="3258343"/>
+            <a:ext cx="1225976" cy="452011"/>
+          </a:xfrm>
+          <a:prstGeom prst="roundRect">
+            <a:avLst/>
+          </a:prstGeom>
+        </p:spPr>
+        <p:style>
+          <a:lnRef idx="2">
+            <a:schemeClr val="accent1">
+              <a:shade val="50000"/>
+            </a:schemeClr>
+          </a:lnRef>
+          <a:fillRef idx="1">
+            <a:schemeClr val="accent1"/>
+          </a:fillRef>
+          <a:effectRef idx="0">
+            <a:schemeClr val="accent1"/>
+          </a:effectRef>
+          <a:fontRef idx="minor">
+            <a:schemeClr val="lt1"/>
+          </a:fontRef>
+        </p:style>
+        <p:txBody>
+          <a:bodyPr rtlCol="0" anchor="ctr"/>
+          <a:lstStyle/>
+          <a:p>
+            <a:pPr algn="ctr"/>
+            <a:r>
+              <a:rPr lang="en-US" dirty="0" smtClean="0"/>
+              <a:t>ID</a:t>
+            </a:r>
+            <a:endParaRPr lang="en-US" dirty="0"/>
+          </a:p>
+        </p:txBody>
+      </p:sp>
+      <p:sp>
+        <p:nvSpPr>
+          <p:cNvPr id="29" name="Rounded Rectangle 28"/>
+          <p:cNvSpPr/>
+          <p:nvPr/>
+        </p:nvSpPr>
+        <p:spPr>
+          <a:xfrm>
+            <a:off x="3756789" y="3829844"/>
+            <a:ext cx="1225976" cy="465198"/>
+          </a:xfrm>
+          <a:prstGeom prst="roundRect">
+            <a:avLst/>
+          </a:prstGeom>
+        </p:spPr>
+        <p:style>
+          <a:lnRef idx="2">
+            <a:schemeClr val="accent1">
+              <a:shade val="50000"/>
+            </a:schemeClr>
+          </a:lnRef>
+          <a:fillRef idx="1">
+            <a:schemeClr val="accent1"/>
+          </a:fillRef>
+          <a:effectRef idx="0">
+            <a:schemeClr val="accent1"/>
+          </a:effectRef>
+          <a:fontRef idx="minor">
+            <a:schemeClr val="lt1"/>
+          </a:fontRef>
+        </p:style>
+        <p:txBody>
+          <a:bodyPr rtlCol="0" anchor="ctr"/>
+          <a:lstStyle/>
+          <a:p>
+            <a:pPr algn="ctr"/>
+            <a:r>
+              <a:rPr lang="en-US" dirty="0" smtClean="0"/>
+              <a:t>Search</a:t>
             </a:r>
             <a:endParaRPr lang="en-US" dirty="0"/>
           </a:p>
@@ -4735,7 +5461,7 @@
     </p:spTree>
     <p:extLst>
       <p:ext uri="{BB962C8B-B14F-4D97-AF65-F5344CB8AC3E}">
-        <p14:creationId xmlns:p14="http://schemas.microsoft.com/office/powerpoint/2010/main" val="2356678903"/>
+        <p14:creationId xmlns:p14="http://schemas.microsoft.com/office/powerpoint/2010/main" val="1053744780"/>
       </p:ext>
     </p:extLst>
   </p:cSld>
@@ -4778,6 +5504,222 @@
           <a:lstStyle/>
           <a:p>
             <a:r>
+              <a:rPr lang="en-US" dirty="0" smtClean="0"/>
+              <a:t>Login</a:t>
+            </a:r>
+            <a:endParaRPr lang="en-US" dirty="0"/>
+          </a:p>
+        </p:txBody>
+      </p:sp>
+      <p:sp>
+        <p:nvSpPr>
+          <p:cNvPr id="3" name="Content Placeholder 2"/>
+          <p:cNvSpPr>
+            <a:spLocks noGrp="1"/>
+          </p:cNvSpPr>
+          <p:nvPr>
+            <p:ph idx="1"/>
+          </p:nvPr>
+        </p:nvSpPr>
+        <p:spPr/>
+        <p:txBody>
+          <a:bodyPr/>
+          <a:lstStyle/>
+          <a:p>
+            <a:r>
+              <a:rPr lang="en-US" dirty="0"/>
+              <a:t>5</a:t>
+            </a:r>
+            <a:endParaRPr lang="en-US" dirty="0"/>
+          </a:p>
+        </p:txBody>
+      </p:sp>
+      <p:sp>
+        <p:nvSpPr>
+          <p:cNvPr id="4" name="Rectangle 3"/>
+          <p:cNvSpPr/>
+          <p:nvPr/>
+        </p:nvSpPr>
+        <p:spPr>
+          <a:xfrm>
+            <a:off x="4123592" y="2365131"/>
+            <a:ext cx="3130062" cy="3437792"/>
+          </a:xfrm>
+          <a:prstGeom prst="rect">
+            <a:avLst/>
+          </a:prstGeom>
+        </p:spPr>
+        <p:style>
+          <a:lnRef idx="2">
+            <a:schemeClr val="accent1">
+              <a:shade val="50000"/>
+            </a:schemeClr>
+          </a:lnRef>
+          <a:fillRef idx="1">
+            <a:schemeClr val="accent1"/>
+          </a:fillRef>
+          <a:effectRef idx="0">
+            <a:schemeClr val="accent1"/>
+          </a:effectRef>
+          <a:fontRef idx="minor">
+            <a:schemeClr val="lt1"/>
+          </a:fontRef>
+        </p:style>
+        <p:txBody>
+          <a:bodyPr rtlCol="0" anchor="ctr"/>
+          <a:lstStyle/>
+          <a:p>
+            <a:pPr algn="ctr"/>
+            <a:endParaRPr lang="en-US"/>
+          </a:p>
+        </p:txBody>
+      </p:sp>
+      <p:sp>
+        <p:nvSpPr>
+          <p:cNvPr id="5" name="Rectangle 4"/>
+          <p:cNvSpPr/>
+          <p:nvPr/>
+        </p:nvSpPr>
+        <p:spPr>
+          <a:xfrm>
+            <a:off x="4624754" y="3596054"/>
+            <a:ext cx="2145323" cy="430823"/>
+          </a:xfrm>
+          <a:prstGeom prst="rect">
+            <a:avLst/>
+          </a:prstGeom>
+          <a:solidFill>
+            <a:schemeClr val="accent3">
+              <a:lumMod val="60000"/>
+              <a:lumOff val="40000"/>
+            </a:schemeClr>
+          </a:solidFill>
+        </p:spPr>
+        <p:style>
+          <a:lnRef idx="2">
+            <a:schemeClr val="accent1">
+              <a:shade val="50000"/>
+            </a:schemeClr>
+          </a:lnRef>
+          <a:fillRef idx="1">
+            <a:schemeClr val="accent1"/>
+          </a:fillRef>
+          <a:effectRef idx="0">
+            <a:schemeClr val="accent1"/>
+          </a:effectRef>
+          <a:fontRef idx="minor">
+            <a:schemeClr val="lt1"/>
+          </a:fontRef>
+        </p:style>
+        <p:txBody>
+          <a:bodyPr rtlCol="0" anchor="ctr"/>
+          <a:lstStyle/>
+          <a:p>
+            <a:pPr algn="ctr"/>
+            <a:r>
+              <a:rPr lang="en-US" dirty="0" smtClean="0"/>
+              <a:t>Username</a:t>
+            </a:r>
+            <a:endParaRPr lang="en-US" dirty="0"/>
+          </a:p>
+        </p:txBody>
+      </p:sp>
+      <p:sp>
+        <p:nvSpPr>
+          <p:cNvPr id="6" name="Rectangle 5"/>
+          <p:cNvSpPr/>
+          <p:nvPr/>
+        </p:nvSpPr>
+        <p:spPr>
+          <a:xfrm>
+            <a:off x="4624754" y="4303834"/>
+            <a:ext cx="2145323" cy="430823"/>
+          </a:xfrm>
+          <a:prstGeom prst="rect">
+            <a:avLst/>
+          </a:prstGeom>
+          <a:solidFill>
+            <a:schemeClr val="accent3">
+              <a:lumMod val="40000"/>
+              <a:lumOff val="60000"/>
+            </a:schemeClr>
+          </a:solidFill>
+        </p:spPr>
+        <p:style>
+          <a:lnRef idx="2">
+            <a:schemeClr val="accent1">
+              <a:shade val="50000"/>
+            </a:schemeClr>
+          </a:lnRef>
+          <a:fillRef idx="1">
+            <a:schemeClr val="accent1"/>
+          </a:fillRef>
+          <a:effectRef idx="0">
+            <a:schemeClr val="accent1"/>
+          </a:effectRef>
+          <a:fontRef idx="minor">
+            <a:schemeClr val="lt1"/>
+          </a:fontRef>
+        </p:style>
+        <p:txBody>
+          <a:bodyPr rtlCol="0" anchor="ctr"/>
+          <a:lstStyle/>
+          <a:p>
+            <a:pPr algn="ctr"/>
+            <a:r>
+              <a:rPr lang="en-US" dirty="0" smtClean="0"/>
+              <a:t>Password</a:t>
+            </a:r>
+            <a:endParaRPr lang="en-US" dirty="0"/>
+          </a:p>
+        </p:txBody>
+      </p:sp>
+    </p:spTree>
+    <p:extLst>
+      <p:ext uri="{BB962C8B-B14F-4D97-AF65-F5344CB8AC3E}">
+        <p14:creationId xmlns:p14="http://schemas.microsoft.com/office/powerpoint/2010/main" val="2356678903"/>
+      </p:ext>
+    </p:extLst>
+  </p:cSld>
+  <p:clrMapOvr>
+    <a:masterClrMapping/>
+  </p:clrMapOvr>
+</p:sld>
+</file>
+
+<file path=ppt/slides/slide6.xml><?xml version="1.0" encoding="utf-8"?>
+<p:sld xmlns:a="http://schemas.openxmlformats.org/drawingml/2006/main" xmlns:r="http://schemas.openxmlformats.org/officeDocument/2006/relationships" xmlns:p="http://schemas.openxmlformats.org/presentationml/2006/main">
+  <p:cSld>
+    <p:spTree>
+      <p:nvGrpSpPr>
+        <p:cNvPr id="1" name=""/>
+        <p:cNvGrpSpPr/>
+        <p:nvPr/>
+      </p:nvGrpSpPr>
+      <p:grpSpPr>
+        <a:xfrm>
+          <a:off x="0" y="0"/>
+          <a:ext cx="0" cy="0"/>
+          <a:chOff x="0" y="0"/>
+          <a:chExt cx="0" cy="0"/>
+        </a:xfrm>
+      </p:grpSpPr>
+      <p:sp>
+        <p:nvSpPr>
+          <p:cNvPr id="2" name="Title 1"/>
+          <p:cNvSpPr>
+            <a:spLocks noGrp="1"/>
+          </p:cNvSpPr>
+          <p:nvPr>
+            <p:ph type="title"/>
+          </p:nvPr>
+        </p:nvSpPr>
+        <p:spPr/>
+        <p:txBody>
+          <a:bodyPr/>
+          <a:lstStyle/>
+          <a:p>
+            <a:r>
               <a:rPr lang="en-US" dirty="0" err="1" smtClean="0"/>
               <a:t>Sign_In</a:t>
             </a:r>
@@ -4801,8 +5743,8 @@
           <a:lstStyle/>
           <a:p>
             <a:r>
-              <a:rPr lang="en-US" dirty="0" smtClean="0"/>
-              <a:t>5</a:t>
+              <a:rPr lang="en-US" dirty="0"/>
+              <a:t>6</a:t>
             </a:r>
             <a:endParaRPr lang="en-US" dirty="0"/>
           </a:p>

</xml_diff>